<commit_message>
infinite projection matrix support
</commit_message>
<xml_diff>
--- a/specification/1.1/figures/pptx/figures.pptx
+++ b/specification/1.1/figures/pptx/figures.pptx
@@ -1,18 +1,19 @@
 
 <file path=ppt/presentation.xml><?xml version="1.0" encoding="utf-8"?>
-<p:presentation xmlns:a="http://schemas.openxmlformats.org/drawingml/2006/main" xmlns:r="http://schemas.openxmlformats.org/officeDocument/2006/relationships" xmlns:p="http://schemas.openxmlformats.org/presentationml/2006/main" strictFirstAndLastChars="0" saveSubsetFonts="1" autoCompressPictures="0">
+<p:presentation xmlns:a="http://schemas.openxmlformats.org/drawingml/2006/main" xmlns:r="http://schemas.openxmlformats.org/officeDocument/2006/relationships" xmlns:p="http://schemas.openxmlformats.org/presentationml/2006/main" removePersonalInfoOnSave="1" strictFirstAndLastChars="0" saveSubsetFonts="1" autoCompressPictures="0">
   <p:sldMasterIdLst>
     <p:sldMasterId id="2147483728" r:id="rId1"/>
   </p:sldMasterIdLst>
   <p:notesMasterIdLst>
-    <p:notesMasterId r:id="rId4"/>
+    <p:notesMasterId r:id="rId5"/>
   </p:notesMasterIdLst>
   <p:handoutMasterIdLst>
-    <p:handoutMasterId r:id="rId5"/>
+    <p:handoutMasterId r:id="rId6"/>
   </p:handoutMasterIdLst>
   <p:sldIdLst>
     <p:sldId id="3181" r:id="rId2"/>
     <p:sldId id="3168" r:id="rId3"/>
+    <p:sldId id="3182" r:id="rId4"/>
   </p:sldIdLst>
   <p:sldSz cx="10972800" cy="6172200"/>
   <p:notesSz cx="6858000" cy="9144000"/>
@@ -165,12 +166,28 @@
       </a:defRPr>
     </a:lvl9pPr>
   </p:defaultTextStyle>
+  <p:extLst>
+    <p:ext uri="{EFAFB233-063F-42B5-8137-9DF3F51BA10A}">
+      <p15:sldGuideLst xmlns:p15="http://schemas.microsoft.com/office/powerpoint/2012/main">
+        <p15:guide id="1" orient="horz" pos="1944">
+          <p15:clr>
+            <a:srgbClr val="A4A3A4"/>
+          </p15:clr>
+        </p15:guide>
+        <p15:guide id="2" pos="3456">
+          <p15:clr>
+            <a:srgbClr val="A4A3A4"/>
+          </p15:clr>
+        </p15:guide>
+      </p15:sldGuideLst>
+    </p:ext>
+  </p:extLst>
 </p:presentation>
 </file>
 
 <file path=ppt/commentAuthors.xml><?xml version="1.0" encoding="utf-8"?>
 <p:cmAuthorLst xmlns:a="http://schemas.openxmlformats.org/drawingml/2006/main" xmlns:r="http://schemas.openxmlformats.org/officeDocument/2006/relationships" xmlns:p="http://schemas.openxmlformats.org/presentationml/2006/main">
-  <p:cmAuthor id="0" name="Author" initials="A" lastIdx="2" clrIdx="0"/>
+  <p:cmAuthor id="1" name="Автор" initials="A" lastIdx="0" clrIdx="1"/>
 </p:cmAuthorLst>
 </file>
 
@@ -292,7 +309,7 @@
               <a:pPr>
                 <a:defRPr/>
               </a:pPr>
-              <a:t>10/15/15</a:t>
+              <a:t>9/24/2016</a:t>
             </a:fld>
             <a:endParaRPr lang="en-US"/>
           </a:p>
@@ -508,7 +525,7 @@
               <a:pPr>
                 <a:defRPr/>
               </a:pPr>
-              <a:t>10/15/15</a:t>
+              <a:t>9/24/2016</a:t>
             </a:fld>
             <a:endParaRPr lang="en-US"/>
           </a:p>
@@ -870,322 +887,6 @@
           <a:bodyPr/>
           <a:lstStyle/>
           <a:p>
-            <a:r>
-              <a:rPr lang="en-US" dirty="0" smtClean="0"/>
-              <a:t>Bottom-up:</a:t>
-            </a:r>
-          </a:p>
-          <a:p>
-            <a:endParaRPr lang="en-US" dirty="0" smtClean="0"/>
-          </a:p>
-          <a:p>
-            <a:r>
-              <a:rPr lang="en-US" dirty="0" smtClean="0"/>
-              <a:t>Geometry</a:t>
-            </a:r>
-          </a:p>
-          <a:p>
-            <a:pPr marL="171450" indent="-171450">
-              <a:buFontTx/>
-              <a:buChar char="•"/>
-            </a:pPr>
-            <a:r>
-              <a:rPr lang="en-US" dirty="0" smtClean="0"/>
-              <a:t>buffer – binary blob.  Can be combination of geometry, animation, and skins</a:t>
-            </a:r>
-          </a:p>
-          <a:p>
-            <a:pPr marL="171450" indent="-171450">
-              <a:buFontTx/>
-              <a:buChar char="•"/>
-            </a:pPr>
-            <a:r>
-              <a:rPr lang="en-US" dirty="0" smtClean="0"/>
-              <a:t>bufferView</a:t>
-            </a:r>
-            <a:r>
-              <a:rPr lang="en-US" baseline="0" dirty="0" smtClean="0"/>
-              <a:t> – subset of buffer with target info (ARRAY_BUFFER, ELEMENT_BUFFER, animation/skin)</a:t>
-            </a:r>
-          </a:p>
-          <a:p>
-            <a:pPr marL="171450" indent="-171450">
-              <a:buFontTx/>
-              <a:buChar char="•"/>
-            </a:pPr>
-            <a:r>
-              <a:rPr lang="en-US" baseline="0" dirty="0" smtClean="0"/>
-              <a:t>accessor – subset of bufferView with type info, e.g., float-point.  Similar to a call to </a:t>
-            </a:r>
-            <a:r>
-              <a:rPr lang="en-US" baseline="0" dirty="0" err="1" smtClean="0"/>
-              <a:t>glVertexAttribPointer</a:t>
-            </a:r>
-            <a:endParaRPr lang="en-US" baseline="0" dirty="0" smtClean="0"/>
-          </a:p>
-          <a:p>
-            <a:pPr marL="628650" lvl="1" indent="-171450">
-              <a:buFontTx/>
-              <a:buChar char="•"/>
-            </a:pPr>
-            <a:r>
-              <a:rPr lang="en-US" baseline="0" dirty="0" smtClean="0"/>
-              <a:t>For example, a bufferView may be all vertices in the asset (think </a:t>
-            </a:r>
-            <a:r>
-              <a:rPr lang="en-US" baseline="0" dirty="0" err="1" smtClean="0"/>
-              <a:t>glBufferData</a:t>
-            </a:r>
-            <a:r>
-              <a:rPr lang="en-US" baseline="0" dirty="0" smtClean="0"/>
-              <a:t>), where as an accessor may be an individual attribute for a mesh (think </a:t>
-            </a:r>
-            <a:r>
-              <a:rPr lang="en-US" baseline="0" dirty="0" err="1" smtClean="0"/>
-              <a:t>glVertexAttribPointer</a:t>
-            </a:r>
-            <a:r>
-              <a:rPr lang="en-US" baseline="0" dirty="0" smtClean="0"/>
-              <a:t>)</a:t>
-            </a:r>
-          </a:p>
-          <a:p>
-            <a:pPr marL="171450" lvl="0" indent="-171450">
-              <a:buFontTx/>
-              <a:buChar char="•"/>
-            </a:pPr>
-            <a:r>
-              <a:rPr lang="en-US" baseline="0" dirty="0" smtClean="0"/>
-              <a:t>mesh – (composed of primitives, not shown) – corresponds to </a:t>
-            </a:r>
-            <a:r>
-              <a:rPr lang="en-US" baseline="0" dirty="0" err="1" smtClean="0"/>
-              <a:t>glDrawElements</a:t>
-            </a:r>
-            <a:r>
-              <a:rPr lang="en-US" baseline="0" dirty="0" smtClean="0"/>
-              <a:t> and </a:t>
-            </a:r>
-            <a:r>
-              <a:rPr lang="en-US" baseline="0" dirty="0" err="1" smtClean="0"/>
-              <a:t>glDrawArrays</a:t>
-            </a:r>
-            <a:endParaRPr lang="en-US" baseline="0" dirty="0" smtClean="0"/>
-          </a:p>
-          <a:p>
-            <a:pPr marL="171450" lvl="0" indent="-171450">
-              <a:buFontTx/>
-              <a:buChar char="•"/>
-            </a:pPr>
-            <a:r>
-              <a:rPr lang="en-US" baseline="0" dirty="0" smtClean="0"/>
-              <a:t>node – one or more meshes, plus transform, plus children, plus optional skin.</a:t>
-            </a:r>
-          </a:p>
-          <a:p>
-            <a:pPr marL="0" lvl="0" indent="0">
-              <a:buFontTx/>
-              <a:buNone/>
-            </a:pPr>
-            <a:endParaRPr lang="en-US" dirty="0" smtClean="0"/>
-          </a:p>
-          <a:p>
-            <a:pPr marL="0" lvl="0" indent="0">
-              <a:buFontTx/>
-              <a:buNone/>
-            </a:pPr>
-            <a:r>
-              <a:rPr lang="en-US" dirty="0" smtClean="0"/>
-              <a:t>Material</a:t>
-            </a:r>
-          </a:p>
-          <a:p>
-            <a:pPr marL="171450" lvl="0" indent="-171450">
-              <a:buFont typeface="Arial"/>
-              <a:buChar char="•"/>
-            </a:pPr>
-            <a:r>
-              <a:rPr lang="en-US" dirty="0" smtClean="0"/>
-              <a:t>image – Image file</a:t>
-            </a:r>
-          </a:p>
-          <a:p>
-            <a:pPr marL="171450" lvl="0" indent="-171450">
-              <a:buFont typeface="Arial"/>
-              <a:buChar char="•"/>
-            </a:pPr>
-            <a:r>
-              <a:rPr lang="en-US" dirty="0" smtClean="0"/>
-              <a:t>sampler – texture filter and wrap modes, think</a:t>
-            </a:r>
-            <a:r>
-              <a:rPr lang="en-US" baseline="0" dirty="0" smtClean="0"/>
-              <a:t> </a:t>
-            </a:r>
-            <a:r>
-              <a:rPr lang="en-US" baseline="0" dirty="0" err="1" smtClean="0"/>
-              <a:t>glTexParameter</a:t>
-            </a:r>
-            <a:endParaRPr lang="en-US" dirty="0" smtClean="0"/>
-          </a:p>
-          <a:p>
-            <a:pPr marL="171450" lvl="0" indent="-171450">
-              <a:buFont typeface="Arial"/>
-              <a:buChar char="•"/>
-            </a:pPr>
-            <a:r>
-              <a:rPr lang="en-US" dirty="0" smtClean="0"/>
-              <a:t>texture – think glTexImage2D</a:t>
-            </a:r>
-          </a:p>
-          <a:p>
-            <a:pPr marL="171450" lvl="0" indent="-171450">
-              <a:buFont typeface="Arial"/>
-              <a:buChar char="•"/>
-            </a:pPr>
-            <a:endParaRPr lang="en-US" dirty="0" smtClean="0"/>
-          </a:p>
-          <a:p>
-            <a:pPr marL="171450" lvl="0" indent="-171450">
-              <a:buFont typeface="Arial"/>
-              <a:buChar char="•"/>
-            </a:pPr>
-            <a:r>
-              <a:rPr lang="en-US" dirty="0" smtClean="0"/>
-              <a:t>shader – GLSL shader source</a:t>
-            </a:r>
-          </a:p>
-          <a:p>
-            <a:pPr marL="171450" lvl="0" indent="-171450">
-              <a:buFont typeface="Arial"/>
-              <a:buChar char="•"/>
-            </a:pPr>
-            <a:r>
-              <a:rPr lang="en-US" dirty="0" smtClean="0"/>
-              <a:t>program – think </a:t>
-            </a:r>
-            <a:r>
-              <a:rPr lang="en-US" dirty="0" err="1" smtClean="0"/>
-              <a:t>glCompileShader</a:t>
-            </a:r>
-            <a:r>
-              <a:rPr lang="en-US" dirty="0" smtClean="0"/>
-              <a:t> and </a:t>
-            </a:r>
-            <a:r>
-              <a:rPr lang="en-US" dirty="0" err="1" smtClean="0"/>
-              <a:t>glLinkProgram</a:t>
-            </a:r>
-            <a:endParaRPr lang="en-US" dirty="0" smtClean="0"/>
-          </a:p>
-          <a:p>
-            <a:pPr marL="171450" lvl="0" indent="-171450">
-              <a:buFont typeface="Arial"/>
-              <a:buChar char="•"/>
-            </a:pPr>
-            <a:r>
-              <a:rPr lang="en-US" dirty="0" smtClean="0"/>
-              <a:t>technique – parameter inputs (attributes + uniforms) + pass – program + render state</a:t>
-            </a:r>
-          </a:p>
-          <a:p>
-            <a:pPr marL="171450" lvl="0" indent="-171450">
-              <a:buFont typeface="Arial"/>
-              <a:buChar char="•"/>
-            </a:pPr>
-            <a:r>
-              <a:rPr lang="en-US" dirty="0" smtClean="0"/>
-              <a:t>Material – an instance of a technique.  Overrides parameter inputs</a:t>
-            </a:r>
-          </a:p>
-          <a:p>
-            <a:pPr marL="171450" lvl="0" indent="-171450">
-              <a:buFont typeface="Arial"/>
-              <a:buChar char="•"/>
-            </a:pPr>
-            <a:endParaRPr lang="en-US" dirty="0" smtClean="0"/>
-          </a:p>
-          <a:p>
-            <a:pPr marL="0" lvl="0" indent="0">
-              <a:buFont typeface="Arial"/>
-              <a:buNone/>
-            </a:pPr>
-            <a:r>
-              <a:rPr lang="en-US" dirty="0" smtClean="0"/>
-              <a:t>Animation</a:t>
-            </a:r>
-          </a:p>
-          <a:p>
-            <a:pPr marL="171450" lvl="0" indent="-171450">
-              <a:buFont typeface="Arial"/>
-              <a:buChar char="•"/>
-            </a:pPr>
-            <a:r>
-              <a:rPr lang="en-US" dirty="0" smtClean="0"/>
-              <a:t>animation accesses </a:t>
-            </a:r>
-            <a:r>
-              <a:rPr lang="en-US" dirty="0" err="1" smtClean="0"/>
-              <a:t>keyframes</a:t>
-            </a:r>
-            <a:r>
-              <a:rPr lang="en-US" dirty="0" smtClean="0"/>
-              <a:t> from accessor</a:t>
-            </a:r>
-          </a:p>
-          <a:p>
-            <a:pPr marL="171450" lvl="0" indent="-171450">
-              <a:buFont typeface="Arial"/>
-              <a:buChar char="•"/>
-            </a:pPr>
-            <a:r>
-              <a:rPr lang="en-US" dirty="0" smtClean="0"/>
-              <a:t>animation targets node (transforms), material/technique parameters, and camera/light</a:t>
-            </a:r>
-          </a:p>
-          <a:p>
-            <a:pPr marL="171450" lvl="0" indent="-171450">
-              <a:buFont typeface="Arial"/>
-              <a:buChar char="•"/>
-            </a:pPr>
-            <a:endParaRPr lang="en-US" dirty="0" smtClean="0"/>
-          </a:p>
-          <a:p>
-            <a:pPr marL="0" lvl="0" indent="0">
-              <a:buFont typeface="Arial"/>
-              <a:buNone/>
-            </a:pPr>
-            <a:r>
-              <a:rPr lang="en-US" dirty="0" smtClean="0"/>
-              <a:t>Skin</a:t>
-            </a:r>
-          </a:p>
-          <a:p>
-            <a:pPr marL="171450" lvl="0" indent="-171450">
-              <a:buFontTx/>
-              <a:buChar char="•"/>
-            </a:pPr>
-            <a:r>
-              <a:rPr lang="en-US" dirty="0" smtClean="0"/>
-              <a:t>skin accesses inverse-bind</a:t>
-            </a:r>
-            <a:r>
-              <a:rPr lang="en-US" baseline="0" dirty="0" smtClean="0"/>
-              <a:t> matrices from accessor</a:t>
-            </a:r>
-          </a:p>
-          <a:p>
-            <a:pPr marL="171450" lvl="0" indent="-171450">
-              <a:buFontTx/>
-              <a:buChar char="•"/>
-            </a:pPr>
-            <a:r>
-              <a:rPr lang="en-US" baseline="0" dirty="0" smtClean="0"/>
-              <a:t>node references skins.  skins reference nodes</a:t>
-            </a:r>
-            <a:endParaRPr lang="en-US" dirty="0" smtClean="0"/>
-          </a:p>
-          <a:p>
             <a:pPr marL="171450" lvl="0" indent="-171450">
               <a:buFont typeface="Arial"/>
               <a:buChar char="•"/>
@@ -1372,13 +1073,13 @@
   <p:clrMapOvr>
     <a:masterClrMapping/>
   </p:clrMapOvr>
-  <p:transition xmlns:p14="http://schemas.microsoft.com/office/powerpoint/2010/main">
+  <p:transition>
     <p:fade/>
   </p:transition>
   <p:timing>
     <p:tnLst>
       <p:par>
-        <p:cTn xmlns:p14="http://schemas.microsoft.com/office/powerpoint/2010/main" id="1" dur="indefinite" restart="never" nodeType="tmRoot"/>
+        <p:cTn id="1" dur="indefinite" restart="never" nodeType="tmRoot"/>
       </p:par>
     </p:tnLst>
   </p:timing>
@@ -1657,13 +1358,13 @@
   <p:clrMapOvr>
     <a:masterClrMapping/>
   </p:clrMapOvr>
-  <p:transition xmlns:p14="http://schemas.microsoft.com/office/powerpoint/2010/main">
+  <p:transition>
     <p:fade/>
   </p:transition>
   <p:timing>
     <p:tnLst>
       <p:par>
-        <p:cTn xmlns:p14="http://schemas.microsoft.com/office/powerpoint/2010/main" id="1" dur="indefinite" restart="never" nodeType="tmRoot"/>
+        <p:cTn id="1" dur="indefinite" restart="never" nodeType="tmRoot"/>
       </p:par>
     </p:tnLst>
   </p:timing>
@@ -1962,13 +1663,13 @@
   <p:clrMapOvr>
     <a:masterClrMapping/>
   </p:clrMapOvr>
-  <p:transition xmlns:p14="http://schemas.microsoft.com/office/powerpoint/2010/main">
+  <p:transition>
     <p:fade/>
   </p:transition>
   <p:timing>
     <p:tnLst>
       <p:par>
-        <p:cTn xmlns:p14="http://schemas.microsoft.com/office/powerpoint/2010/main" id="1" dur="indefinite" restart="never" nodeType="tmRoot"/>
+        <p:cTn id="1" dur="indefinite" restart="never" nodeType="tmRoot"/>
       </p:par>
     </p:tnLst>
   </p:timing>
@@ -2234,13 +1935,13 @@
     <p:sldLayoutId id="2147483763" r:id="rId2"/>
     <p:sldLayoutId id="2147483801" r:id="rId3"/>
   </p:sldLayoutIdLst>
-  <p:transition xmlns:p14="http://schemas.microsoft.com/office/powerpoint/2010/main">
+  <p:transition>
     <p:fade/>
   </p:transition>
   <p:timing>
     <p:tnLst>
       <p:par>
-        <p:cTn xmlns:p14="http://schemas.microsoft.com/office/powerpoint/2010/main" id="1" dur="indefinite" restart="never" nodeType="tmRoot"/>
+        <p:cTn id="1" dur="indefinite" restart="never" nodeType="tmRoot"/>
       </p:par>
     </p:tnLst>
   </p:timing>
@@ -3242,13 +2943,13 @@
   <p:clrMapOvr>
     <a:masterClrMapping/>
   </p:clrMapOvr>
-  <p:transition xmlns:p14="http://schemas.microsoft.com/office/powerpoint/2010/main" spd="slow">
+  <p:transition spd="slow">
     <p:strips dir="rd"/>
   </p:transition>
   <p:timing>
     <p:tnLst>
       <p:par>
-        <p:cTn xmlns:p14="http://schemas.microsoft.com/office/powerpoint/2010/main" id="1" dur="indefinite" restart="never" nodeType="tmRoot"/>
+        <p:cTn id="1" dur="indefinite" restart="never" nodeType="tmRoot"/>
       </p:par>
     </p:tnLst>
   </p:timing>
@@ -5538,16 +5239,1565 @@
   <p:clrMapOvr>
     <a:masterClrMapping/>
   </p:clrMapOvr>
-  <p:transition xmlns:p14="http://schemas.microsoft.com/office/powerpoint/2010/main" spd="slow">
+  <p:transition spd="slow">
     <p:strips dir="rd"/>
   </p:transition>
   <p:timing>
     <p:tnLst>
       <p:par>
-        <p:cTn xmlns:p14="http://schemas.microsoft.com/office/powerpoint/2010/main" id="1" dur="indefinite" restart="never" nodeType="tmRoot"/>
+        <p:cTn id="1" dur="indefinite" restart="never" nodeType="tmRoot"/>
       </p:par>
     </p:tnLst>
   </p:timing>
+</p:sld>
+</file>
+
+<file path=ppt/slides/slide3.xml><?xml version="1.0" encoding="utf-8"?>
+<p:sld xmlns:a="http://schemas.openxmlformats.org/drawingml/2006/main" xmlns:r="http://schemas.openxmlformats.org/officeDocument/2006/relationships" xmlns:p="http://schemas.openxmlformats.org/presentationml/2006/main">
+  <p:cSld>
+    <p:spTree>
+      <p:nvGrpSpPr>
+        <p:cNvPr id="1" name=""/>
+        <p:cNvGrpSpPr/>
+        <p:nvPr/>
+      </p:nvGrpSpPr>
+      <p:grpSpPr>
+        <a:xfrm>
+          <a:off x="0" y="0"/>
+          <a:ext cx="0" cy="0"/>
+          <a:chOff x="0" y="0"/>
+          <a:chExt cx="0" cy="0"/>
+        </a:xfrm>
+      </p:grpSpPr>
+      <mc:AlternateContent xmlns:mc="http://schemas.openxmlformats.org/markup-compatibility/2006">
+        <mc:Choice xmlns:a14="http://schemas.microsoft.com/office/drawing/2010/main" Requires="a14">
+          <p:sp>
+            <p:nvSpPr>
+              <p:cNvPr id="4" name="Прямоугольник 3"/>
+              <p:cNvSpPr/>
+              <p:nvPr/>
+            </p:nvSpPr>
+            <p:spPr>
+              <a:xfrm>
+                <a:off x="762000" y="419100"/>
+                <a:ext cx="4751108" cy="1982081"/>
+              </a:xfrm>
+              <a:prstGeom prst="rect">
+                <a:avLst/>
+              </a:prstGeom>
+            </p:spPr>
+            <p:txBody>
+              <a:bodyPr wrap="none">
+                <a:spAutoFit/>
+              </a:bodyPr>
+              <a:lstStyle/>
+              <a:p>
+                <a14:m>
+                  <m:oMathPara xmlns:m="http://schemas.openxmlformats.org/officeDocument/2006/math">
+                    <m:oMathParaPr>
+                      <m:jc m:val="centerGroup"/>
+                    </m:oMathParaPr>
+                    <m:oMath xmlns:m="http://schemas.openxmlformats.org/officeDocument/2006/math">
+                      <m:d>
+                        <m:dPr>
+                          <m:ctrlPr>
+                            <a:rPr lang="ru-RU" smtClean="0">
+                              <a:solidFill>
+                                <a:schemeClr val="tx1"/>
+                              </a:solidFill>
+                              <a:latin typeface="Cambria Math" panose="02040503050406030204" pitchFamily="18" charset="0"/>
+                            </a:rPr>
+                          </m:ctrlPr>
+                        </m:dPr>
+                        <m:e>
+                          <m:m>
+                            <m:mPr>
+                              <m:mcs>
+                                <m:mc>
+                                  <m:mcPr>
+                                    <m:count m:val="4"/>
+                                    <m:mcJc m:val="center"/>
+                                  </m:mcPr>
+                                </m:mc>
+                              </m:mcs>
+                              <m:ctrlPr>
+                                <a:rPr lang="ru-RU">
+                                  <a:solidFill>
+                                    <a:schemeClr val="tx1"/>
+                                  </a:solidFill>
+                                  <a:latin typeface="Cambria Math" panose="02040503050406030204" pitchFamily="18" charset="0"/>
+                                </a:rPr>
+                              </m:ctrlPr>
+                            </m:mPr>
+                            <m:mr>
+                              <m:e>
+                                <m:f>
+                                  <m:fPr>
+                                    <m:ctrlPr>
+                                      <a:rPr lang="ru-RU">
+                                        <a:solidFill>
+                                          <a:schemeClr val="tx1"/>
+                                        </a:solidFill>
+                                        <a:latin typeface="Cambria Math" panose="02040503050406030204" pitchFamily="18" charset="0"/>
+                                      </a:rPr>
+                                    </m:ctrlPr>
+                                  </m:fPr>
+                                  <m:num>
+                                    <m:r>
+                                      <a:rPr lang="ru-RU">
+                                        <a:solidFill>
+                                          <a:schemeClr val="tx1"/>
+                                        </a:solidFill>
+                                        <a:latin typeface="Cambria Math" panose="02040503050406030204" pitchFamily="18" charset="0"/>
+                                      </a:rPr>
+                                      <m:t>1</m:t>
+                                    </m:r>
+                                  </m:num>
+                                  <m:den>
+                                    <m:func>
+                                      <m:funcPr>
+                                        <m:ctrlPr>
+                                          <a:rPr lang="ru-RU" i="1">
+                                            <a:solidFill>
+                                              <a:schemeClr val="tx1"/>
+                                            </a:solidFill>
+                                            <a:latin typeface="Cambria Math" panose="02040503050406030204" pitchFamily="18" charset="0"/>
+                                          </a:rPr>
+                                        </m:ctrlPr>
+                                      </m:funcPr>
+                                      <m:fName>
+                                        <m:r>
+                                          <m:rPr>
+                                            <m:sty m:val="p"/>
+                                          </m:rPr>
+                                          <a:rPr lang="ru-RU" i="0">
+                                            <a:solidFill>
+                                              <a:schemeClr val="tx1"/>
+                                            </a:solidFill>
+                                            <a:latin typeface="Cambria Math" panose="02040503050406030204" pitchFamily="18" charset="0"/>
+                                          </a:rPr>
+                                          <m:t>a</m:t>
+                                        </m:r>
+                                        <m:r>
+                                          <a:rPr lang="ru-RU" i="0">
+                                            <a:solidFill>
+                                              <a:schemeClr val="tx1"/>
+                                            </a:solidFill>
+                                            <a:latin typeface="Cambria Math" panose="02040503050406030204" pitchFamily="18" charset="0"/>
+                                          </a:rPr>
+                                          <m:t>∗</m:t>
+                                        </m:r>
+                                        <m:r>
+                                          <m:rPr>
+                                            <m:sty m:val="p"/>
+                                          </m:rPr>
+                                          <a:rPr lang="ru-RU" i="0">
+                                            <a:solidFill>
+                                              <a:schemeClr val="tx1"/>
+                                            </a:solidFill>
+                                            <a:latin typeface="Cambria Math" panose="02040503050406030204" pitchFamily="18" charset="0"/>
+                                          </a:rPr>
+                                          <m:t>tan</m:t>
+                                        </m:r>
+                                      </m:fName>
+                                      <m:e>
+                                        <m:d>
+                                          <m:dPr>
+                                            <m:ctrlPr>
+                                              <a:rPr lang="ru-RU" i="1">
+                                                <a:solidFill>
+                                                  <a:schemeClr val="tx1"/>
+                                                </a:solidFill>
+                                                <a:latin typeface="Cambria Math" panose="02040503050406030204" pitchFamily="18" charset="0"/>
+                                              </a:rPr>
+                                            </m:ctrlPr>
+                                          </m:dPr>
+                                          <m:e>
+                                            <m:r>
+                                              <a:rPr lang="ru-RU" i="0">
+                                                <a:solidFill>
+                                                  <a:schemeClr val="tx1"/>
+                                                </a:solidFill>
+                                                <a:latin typeface="Cambria Math" panose="02040503050406030204" pitchFamily="18" charset="0"/>
+                                              </a:rPr>
+                                              <m:t>0.5∗</m:t>
+                                            </m:r>
+                                            <m:r>
+                                              <a:rPr lang="ru-RU" i="1">
+                                                <a:solidFill>
+                                                  <a:schemeClr val="tx1"/>
+                                                </a:solidFill>
+                                                <a:latin typeface="Cambria Math" panose="02040503050406030204" pitchFamily="18" charset="0"/>
+                                              </a:rPr>
+                                              <m:t>𝑦</m:t>
+                                            </m:r>
+                                          </m:e>
+                                        </m:d>
+                                      </m:e>
+                                    </m:func>
+                                  </m:den>
+                                </m:f>
+                              </m:e>
+                              <m:e>
+                                <m:r>
+                                  <a:rPr lang="ru-RU" i="0">
+                                    <a:solidFill>
+                                      <a:schemeClr val="tx1"/>
+                                    </a:solidFill>
+                                    <a:latin typeface="Cambria Math" panose="02040503050406030204" pitchFamily="18" charset="0"/>
+                                  </a:rPr>
+                                  <m:t>0</m:t>
+                                </m:r>
+                              </m:e>
+                              <m:e>
+                                <m:r>
+                                  <a:rPr lang="ru-RU" i="0">
+                                    <a:solidFill>
+                                      <a:schemeClr val="tx1"/>
+                                    </a:solidFill>
+                                    <a:latin typeface="Cambria Math" panose="02040503050406030204" pitchFamily="18" charset="0"/>
+                                  </a:rPr>
+                                  <m:t>0</m:t>
+                                </m:r>
+                              </m:e>
+                              <m:e>
+                                <m:r>
+                                  <a:rPr lang="ru-RU" i="0">
+                                    <a:solidFill>
+                                      <a:schemeClr val="tx1"/>
+                                    </a:solidFill>
+                                    <a:latin typeface="Cambria Math" panose="02040503050406030204" pitchFamily="18" charset="0"/>
+                                  </a:rPr>
+                                  <m:t>0</m:t>
+                                </m:r>
+                              </m:e>
+                            </m:mr>
+                            <m:mr>
+                              <m:e>
+                                <m:r>
+                                  <a:rPr lang="ru-RU" i="0">
+                                    <a:solidFill>
+                                      <a:schemeClr val="tx1"/>
+                                    </a:solidFill>
+                                    <a:latin typeface="Cambria Math" panose="02040503050406030204" pitchFamily="18" charset="0"/>
+                                  </a:rPr>
+                                  <m:t>0</m:t>
+                                </m:r>
+                              </m:e>
+                              <m:e>
+                                <m:f>
+                                  <m:fPr>
+                                    <m:ctrlPr>
+                                      <a:rPr lang="ru-RU" i="1">
+                                        <a:solidFill>
+                                          <a:schemeClr val="tx1"/>
+                                        </a:solidFill>
+                                        <a:latin typeface="Cambria Math" panose="02040503050406030204" pitchFamily="18" charset="0"/>
+                                      </a:rPr>
+                                    </m:ctrlPr>
+                                  </m:fPr>
+                                  <m:num>
+                                    <m:r>
+                                      <a:rPr lang="ru-RU" i="0">
+                                        <a:solidFill>
+                                          <a:schemeClr val="tx1"/>
+                                        </a:solidFill>
+                                        <a:latin typeface="Cambria Math" panose="02040503050406030204" pitchFamily="18" charset="0"/>
+                                      </a:rPr>
+                                      <m:t>1</m:t>
+                                    </m:r>
+                                  </m:num>
+                                  <m:den>
+                                    <m:func>
+                                      <m:funcPr>
+                                        <m:ctrlPr>
+                                          <a:rPr lang="ru-RU" i="1">
+                                            <a:solidFill>
+                                              <a:schemeClr val="tx1"/>
+                                            </a:solidFill>
+                                            <a:latin typeface="Cambria Math" panose="02040503050406030204" pitchFamily="18" charset="0"/>
+                                          </a:rPr>
+                                        </m:ctrlPr>
+                                      </m:funcPr>
+                                      <m:fName>
+                                        <m:r>
+                                          <m:rPr>
+                                            <m:sty m:val="p"/>
+                                          </m:rPr>
+                                          <a:rPr lang="ru-RU" i="0">
+                                            <a:solidFill>
+                                              <a:schemeClr val="tx1"/>
+                                            </a:solidFill>
+                                            <a:latin typeface="Cambria Math" panose="02040503050406030204" pitchFamily="18" charset="0"/>
+                                          </a:rPr>
+                                          <m:t>tan</m:t>
+                                        </m:r>
+                                      </m:fName>
+                                      <m:e>
+                                        <m:d>
+                                          <m:dPr>
+                                            <m:ctrlPr>
+                                              <a:rPr lang="ru-RU" i="1">
+                                                <a:solidFill>
+                                                  <a:schemeClr val="tx1"/>
+                                                </a:solidFill>
+                                                <a:latin typeface="Cambria Math" panose="02040503050406030204" pitchFamily="18" charset="0"/>
+                                              </a:rPr>
+                                            </m:ctrlPr>
+                                          </m:dPr>
+                                          <m:e>
+                                            <m:r>
+                                              <a:rPr lang="ru-RU" i="0">
+                                                <a:solidFill>
+                                                  <a:schemeClr val="tx1"/>
+                                                </a:solidFill>
+                                                <a:latin typeface="Cambria Math" panose="02040503050406030204" pitchFamily="18" charset="0"/>
+                                              </a:rPr>
+                                              <m:t>0.5∗</m:t>
+                                            </m:r>
+                                            <m:r>
+                                              <a:rPr lang="ru-RU" i="1">
+                                                <a:solidFill>
+                                                  <a:schemeClr val="tx1"/>
+                                                </a:solidFill>
+                                                <a:latin typeface="Cambria Math" panose="02040503050406030204" pitchFamily="18" charset="0"/>
+                                              </a:rPr>
+                                              <m:t>𝑦</m:t>
+                                            </m:r>
+                                          </m:e>
+                                        </m:d>
+                                      </m:e>
+                                    </m:func>
+                                  </m:den>
+                                </m:f>
+                              </m:e>
+                              <m:e>
+                                <m:r>
+                                  <a:rPr lang="ru-RU" i="0">
+                                    <a:solidFill>
+                                      <a:schemeClr val="tx1"/>
+                                    </a:solidFill>
+                                    <a:latin typeface="Cambria Math" panose="02040503050406030204" pitchFamily="18" charset="0"/>
+                                  </a:rPr>
+                                  <m:t>0</m:t>
+                                </m:r>
+                              </m:e>
+                              <m:e>
+                                <m:r>
+                                  <a:rPr lang="ru-RU" i="0">
+                                    <a:solidFill>
+                                      <a:schemeClr val="tx1"/>
+                                    </a:solidFill>
+                                    <a:latin typeface="Cambria Math" panose="02040503050406030204" pitchFamily="18" charset="0"/>
+                                  </a:rPr>
+                                  <m:t>0</m:t>
+                                </m:r>
+                              </m:e>
+                            </m:mr>
+                            <m:mr>
+                              <m:e>
+                                <m:r>
+                                  <a:rPr lang="ru-RU" i="0">
+                                    <a:solidFill>
+                                      <a:schemeClr val="tx1"/>
+                                    </a:solidFill>
+                                    <a:latin typeface="Cambria Math" panose="02040503050406030204" pitchFamily="18" charset="0"/>
+                                  </a:rPr>
+                                  <m:t>0</m:t>
+                                </m:r>
+                              </m:e>
+                              <m:e>
+                                <m:r>
+                                  <a:rPr lang="ru-RU" i="0">
+                                    <a:solidFill>
+                                      <a:schemeClr val="tx1"/>
+                                    </a:solidFill>
+                                    <a:latin typeface="Cambria Math" panose="02040503050406030204" pitchFamily="18" charset="0"/>
+                                  </a:rPr>
+                                  <m:t>0</m:t>
+                                </m:r>
+                              </m:e>
+                              <m:e>
+                                <m:f>
+                                  <m:fPr>
+                                    <m:ctrlPr>
+                                      <a:rPr lang="ru-RU" i="1">
+                                        <a:solidFill>
+                                          <a:schemeClr val="tx1"/>
+                                        </a:solidFill>
+                                        <a:latin typeface="Cambria Math" panose="02040503050406030204" pitchFamily="18" charset="0"/>
+                                      </a:rPr>
+                                    </m:ctrlPr>
+                                  </m:fPr>
+                                  <m:num>
+                                    <m:r>
+                                      <a:rPr lang="ru-RU" i="1">
+                                        <a:solidFill>
+                                          <a:schemeClr val="tx1"/>
+                                        </a:solidFill>
+                                        <a:latin typeface="Cambria Math" panose="02040503050406030204" pitchFamily="18" charset="0"/>
+                                      </a:rPr>
+                                      <m:t>𝑓</m:t>
+                                    </m:r>
+                                    <m:r>
+                                      <a:rPr lang="ru-RU" i="0">
+                                        <a:solidFill>
+                                          <a:schemeClr val="tx1"/>
+                                        </a:solidFill>
+                                        <a:latin typeface="Cambria Math" panose="02040503050406030204" pitchFamily="18" charset="0"/>
+                                      </a:rPr>
+                                      <m:t>+</m:t>
+                                    </m:r>
+                                    <m:r>
+                                      <a:rPr lang="ru-RU" i="1">
+                                        <a:solidFill>
+                                          <a:schemeClr val="tx1"/>
+                                        </a:solidFill>
+                                        <a:latin typeface="Cambria Math" panose="02040503050406030204" pitchFamily="18" charset="0"/>
+                                      </a:rPr>
+                                      <m:t>𝑛</m:t>
+                                    </m:r>
+                                  </m:num>
+                                  <m:den>
+                                    <m:r>
+                                      <a:rPr lang="ru-RU" i="1">
+                                        <a:solidFill>
+                                          <a:schemeClr val="tx1"/>
+                                        </a:solidFill>
+                                        <a:latin typeface="Cambria Math" panose="02040503050406030204" pitchFamily="18" charset="0"/>
+                                      </a:rPr>
+                                      <m:t>𝑛</m:t>
+                                    </m:r>
+                                    <m:r>
+                                      <a:rPr lang="ru-RU" i="0">
+                                        <a:solidFill>
+                                          <a:schemeClr val="tx1"/>
+                                        </a:solidFill>
+                                        <a:latin typeface="Cambria Math" panose="02040503050406030204" pitchFamily="18" charset="0"/>
+                                      </a:rPr>
+                                      <m:t>−</m:t>
+                                    </m:r>
+                                    <m:r>
+                                      <a:rPr lang="ru-RU" i="1">
+                                        <a:solidFill>
+                                          <a:schemeClr val="tx1"/>
+                                        </a:solidFill>
+                                        <a:latin typeface="Cambria Math" panose="02040503050406030204" pitchFamily="18" charset="0"/>
+                                      </a:rPr>
+                                      <m:t>𝑓</m:t>
+                                    </m:r>
+                                  </m:den>
+                                </m:f>
+                              </m:e>
+                              <m:e>
+                                <m:f>
+                                  <m:fPr>
+                                    <m:ctrlPr>
+                                      <a:rPr lang="ru-RU" i="1">
+                                        <a:solidFill>
+                                          <a:schemeClr val="tx1"/>
+                                        </a:solidFill>
+                                        <a:latin typeface="Cambria Math" panose="02040503050406030204" pitchFamily="18" charset="0"/>
+                                      </a:rPr>
+                                    </m:ctrlPr>
+                                  </m:fPr>
+                                  <m:num>
+                                    <m:r>
+                                      <a:rPr lang="ru-RU" i="0">
+                                        <a:solidFill>
+                                          <a:schemeClr val="tx1"/>
+                                        </a:solidFill>
+                                        <a:latin typeface="Cambria Math" panose="02040503050406030204" pitchFamily="18" charset="0"/>
+                                      </a:rPr>
+                                      <m:t>2</m:t>
+                                    </m:r>
+                                    <m:r>
+                                      <a:rPr lang="ru-RU" i="1">
+                                        <a:solidFill>
+                                          <a:schemeClr val="tx1"/>
+                                        </a:solidFill>
+                                        <a:latin typeface="Cambria Math" panose="02040503050406030204" pitchFamily="18" charset="0"/>
+                                      </a:rPr>
+                                      <m:t>𝑓𝑛</m:t>
+                                    </m:r>
+                                  </m:num>
+                                  <m:den>
+                                    <m:r>
+                                      <a:rPr lang="ru-RU" i="1">
+                                        <a:solidFill>
+                                          <a:schemeClr val="tx1"/>
+                                        </a:solidFill>
+                                        <a:latin typeface="Cambria Math" panose="02040503050406030204" pitchFamily="18" charset="0"/>
+                                      </a:rPr>
+                                      <m:t>𝑛</m:t>
+                                    </m:r>
+                                    <m:r>
+                                      <a:rPr lang="ru-RU" i="0">
+                                        <a:solidFill>
+                                          <a:schemeClr val="tx1"/>
+                                        </a:solidFill>
+                                        <a:latin typeface="Cambria Math" panose="02040503050406030204" pitchFamily="18" charset="0"/>
+                                      </a:rPr>
+                                      <m:t>−</m:t>
+                                    </m:r>
+                                    <m:r>
+                                      <a:rPr lang="ru-RU" i="1">
+                                        <a:solidFill>
+                                          <a:schemeClr val="tx1"/>
+                                        </a:solidFill>
+                                        <a:latin typeface="Cambria Math" panose="02040503050406030204" pitchFamily="18" charset="0"/>
+                                      </a:rPr>
+                                      <m:t>𝑓</m:t>
+                                    </m:r>
+                                  </m:den>
+                                </m:f>
+                              </m:e>
+                            </m:mr>
+                            <m:mr>
+                              <m:e>
+                                <m:r>
+                                  <a:rPr lang="ru-RU" i="0">
+                                    <a:solidFill>
+                                      <a:schemeClr val="tx1"/>
+                                    </a:solidFill>
+                                    <a:latin typeface="Cambria Math" panose="02040503050406030204" pitchFamily="18" charset="0"/>
+                                  </a:rPr>
+                                  <m:t>0</m:t>
+                                </m:r>
+                              </m:e>
+                              <m:e>
+                                <m:r>
+                                  <a:rPr lang="ru-RU" i="0">
+                                    <a:solidFill>
+                                      <a:schemeClr val="tx1"/>
+                                    </a:solidFill>
+                                    <a:latin typeface="Cambria Math" panose="02040503050406030204" pitchFamily="18" charset="0"/>
+                                  </a:rPr>
+                                  <m:t>0</m:t>
+                                </m:r>
+                              </m:e>
+                              <m:e>
+                                <m:r>
+                                  <a:rPr lang="ru-RU" i="0">
+                                    <a:solidFill>
+                                      <a:schemeClr val="tx1"/>
+                                    </a:solidFill>
+                                    <a:latin typeface="Cambria Math" panose="02040503050406030204" pitchFamily="18" charset="0"/>
+                                  </a:rPr>
+                                  <m:t>−1</m:t>
+                                </m:r>
+                              </m:e>
+                              <m:e>
+                                <m:r>
+                                  <a:rPr lang="ru-RU" i="0">
+                                    <a:solidFill>
+                                      <a:schemeClr val="tx1"/>
+                                    </a:solidFill>
+                                    <a:latin typeface="Cambria Math" panose="02040503050406030204" pitchFamily="18" charset="0"/>
+                                  </a:rPr>
+                                  <m:t>0</m:t>
+                                </m:r>
+                              </m:e>
+                            </m:mr>
+                          </m:m>
+                        </m:e>
+                      </m:d>
+                    </m:oMath>
+                  </m:oMathPara>
+                </a14:m>
+                <a:endParaRPr lang="ru-RU" dirty="0">
+                  <a:solidFill>
+                    <a:schemeClr val="tx1"/>
+                  </a:solidFill>
+                </a:endParaRPr>
+              </a:p>
+            </p:txBody>
+          </p:sp>
+        </mc:Choice>
+        <mc:Fallback>
+          <p:sp>
+            <p:nvSpPr>
+              <p:cNvPr id="4" name="Прямоугольник 3"/>
+              <p:cNvSpPr>
+                <a:spLocks noRot="1" noChangeAspect="1" noMove="1" noResize="1" noEditPoints="1" noAdjustHandles="1" noChangeArrowheads="1" noChangeShapeType="1" noTextEdit="1"/>
+              </p:cNvSpPr>
+              <p:nvPr/>
+            </p:nvSpPr>
+            <p:spPr>
+              <a:xfrm>
+                <a:off x="762000" y="419100"/>
+                <a:ext cx="4751108" cy="1982081"/>
+              </a:xfrm>
+              <a:prstGeom prst="rect">
+                <a:avLst/>
+              </a:prstGeom>
+              <a:blipFill>
+                <a:blip r:embed="rId2"/>
+                <a:stretch>
+                  <a:fillRect/>
+                </a:stretch>
+              </a:blipFill>
+            </p:spPr>
+            <p:txBody>
+              <a:bodyPr/>
+              <a:lstStyle/>
+              <a:p>
+                <a:r>
+                  <a:rPr lang="ru-RU">
+                    <a:noFill/>
+                  </a:rPr>
+                  <a:t> </a:t>
+                </a:r>
+              </a:p>
+            </p:txBody>
+          </p:sp>
+        </mc:Fallback>
+      </mc:AlternateContent>
+      <mc:AlternateContent xmlns:mc="http://schemas.openxmlformats.org/markup-compatibility/2006">
+        <mc:Choice xmlns:a14="http://schemas.microsoft.com/office/drawing/2010/main" Requires="a14">
+          <p:sp>
+            <p:nvSpPr>
+              <p:cNvPr id="5" name="Прямоугольник 4"/>
+              <p:cNvSpPr/>
+              <p:nvPr/>
+            </p:nvSpPr>
+            <p:spPr>
+              <a:xfrm>
+                <a:off x="762000" y="2705100"/>
+                <a:ext cx="4415631" cy="1660198"/>
+              </a:xfrm>
+              <a:prstGeom prst="rect">
+                <a:avLst/>
+              </a:prstGeom>
+            </p:spPr>
+            <p:txBody>
+              <a:bodyPr wrap="none">
+                <a:spAutoFit/>
+              </a:bodyPr>
+              <a:lstStyle/>
+              <a:p>
+                <a14:m>
+                  <m:oMathPara xmlns:m="http://schemas.openxmlformats.org/officeDocument/2006/math">
+                    <m:oMathParaPr>
+                      <m:jc m:val="centerGroup"/>
+                    </m:oMathParaPr>
+                    <m:oMath xmlns:m="http://schemas.openxmlformats.org/officeDocument/2006/math">
+                      <m:d>
+                        <m:dPr>
+                          <m:ctrlPr>
+                            <a:rPr lang="ru-RU" smtClean="0">
+                              <a:solidFill>
+                                <a:schemeClr val="tx1"/>
+                              </a:solidFill>
+                              <a:latin typeface="Cambria Math" panose="02040503050406030204" pitchFamily="18" charset="0"/>
+                            </a:rPr>
+                          </m:ctrlPr>
+                        </m:dPr>
+                        <m:e>
+                          <m:m>
+                            <m:mPr>
+                              <m:mcs>
+                                <m:mc>
+                                  <m:mcPr>
+                                    <m:count m:val="4"/>
+                                    <m:mcJc m:val="center"/>
+                                  </m:mcPr>
+                                </m:mc>
+                              </m:mcs>
+                              <m:ctrlPr>
+                                <a:rPr lang="ru-RU">
+                                  <a:solidFill>
+                                    <a:schemeClr val="tx1"/>
+                                  </a:solidFill>
+                                  <a:latin typeface="Cambria Math" panose="02040503050406030204" pitchFamily="18" charset="0"/>
+                                </a:rPr>
+                              </m:ctrlPr>
+                            </m:mPr>
+                            <m:mr>
+                              <m:e>
+                                <m:f>
+                                  <m:fPr>
+                                    <m:ctrlPr>
+                                      <a:rPr lang="ru-RU">
+                                        <a:solidFill>
+                                          <a:schemeClr val="tx1"/>
+                                        </a:solidFill>
+                                        <a:latin typeface="Cambria Math" panose="02040503050406030204" pitchFamily="18" charset="0"/>
+                                      </a:rPr>
+                                    </m:ctrlPr>
+                                  </m:fPr>
+                                  <m:num>
+                                    <m:r>
+                                      <a:rPr lang="ru-RU">
+                                        <a:solidFill>
+                                          <a:schemeClr val="tx1"/>
+                                        </a:solidFill>
+                                        <a:latin typeface="Cambria Math" panose="02040503050406030204" pitchFamily="18" charset="0"/>
+                                      </a:rPr>
+                                      <m:t>1</m:t>
+                                    </m:r>
+                                  </m:num>
+                                  <m:den>
+                                    <m:func>
+                                      <m:funcPr>
+                                        <m:ctrlPr>
+                                          <a:rPr lang="ru-RU" i="1">
+                                            <a:solidFill>
+                                              <a:schemeClr val="tx1"/>
+                                            </a:solidFill>
+                                            <a:latin typeface="Cambria Math" panose="02040503050406030204" pitchFamily="18" charset="0"/>
+                                          </a:rPr>
+                                        </m:ctrlPr>
+                                      </m:funcPr>
+                                      <m:fName>
+                                        <m:r>
+                                          <m:rPr>
+                                            <m:sty m:val="p"/>
+                                          </m:rPr>
+                                          <a:rPr lang="ru-RU" i="0">
+                                            <a:solidFill>
+                                              <a:schemeClr val="tx1"/>
+                                            </a:solidFill>
+                                            <a:latin typeface="Cambria Math" panose="02040503050406030204" pitchFamily="18" charset="0"/>
+                                          </a:rPr>
+                                          <m:t>a</m:t>
+                                        </m:r>
+                                        <m:r>
+                                          <a:rPr lang="ru-RU" i="0">
+                                            <a:solidFill>
+                                              <a:schemeClr val="tx1"/>
+                                            </a:solidFill>
+                                            <a:latin typeface="Cambria Math" panose="02040503050406030204" pitchFamily="18" charset="0"/>
+                                          </a:rPr>
+                                          <m:t>∗</m:t>
+                                        </m:r>
+                                        <m:r>
+                                          <m:rPr>
+                                            <m:sty m:val="p"/>
+                                          </m:rPr>
+                                          <a:rPr lang="ru-RU" i="0">
+                                            <a:solidFill>
+                                              <a:schemeClr val="tx1"/>
+                                            </a:solidFill>
+                                            <a:latin typeface="Cambria Math" panose="02040503050406030204" pitchFamily="18" charset="0"/>
+                                          </a:rPr>
+                                          <m:t>tan</m:t>
+                                        </m:r>
+                                      </m:fName>
+                                      <m:e>
+                                        <m:d>
+                                          <m:dPr>
+                                            <m:ctrlPr>
+                                              <a:rPr lang="ru-RU" i="1">
+                                                <a:solidFill>
+                                                  <a:schemeClr val="tx1"/>
+                                                </a:solidFill>
+                                                <a:latin typeface="Cambria Math" panose="02040503050406030204" pitchFamily="18" charset="0"/>
+                                              </a:rPr>
+                                            </m:ctrlPr>
+                                          </m:dPr>
+                                          <m:e>
+                                            <m:r>
+                                              <a:rPr lang="ru-RU" i="0">
+                                                <a:solidFill>
+                                                  <a:schemeClr val="tx1"/>
+                                                </a:solidFill>
+                                                <a:latin typeface="Cambria Math" panose="02040503050406030204" pitchFamily="18" charset="0"/>
+                                              </a:rPr>
+                                              <m:t>0.5∗</m:t>
+                                            </m:r>
+                                            <m:r>
+                                              <a:rPr lang="ru-RU" i="1">
+                                                <a:solidFill>
+                                                  <a:schemeClr val="tx1"/>
+                                                </a:solidFill>
+                                                <a:latin typeface="Cambria Math" panose="02040503050406030204" pitchFamily="18" charset="0"/>
+                                              </a:rPr>
+                                              <m:t>𝑦</m:t>
+                                            </m:r>
+                                          </m:e>
+                                        </m:d>
+                                      </m:e>
+                                    </m:func>
+                                  </m:den>
+                                </m:f>
+                              </m:e>
+                              <m:e>
+                                <m:r>
+                                  <a:rPr lang="ru-RU" i="0">
+                                    <a:solidFill>
+                                      <a:schemeClr val="tx1"/>
+                                    </a:solidFill>
+                                    <a:latin typeface="Cambria Math" panose="02040503050406030204" pitchFamily="18" charset="0"/>
+                                  </a:rPr>
+                                  <m:t>0</m:t>
+                                </m:r>
+                              </m:e>
+                              <m:e>
+                                <m:r>
+                                  <a:rPr lang="ru-RU" i="0">
+                                    <a:solidFill>
+                                      <a:schemeClr val="tx1"/>
+                                    </a:solidFill>
+                                    <a:latin typeface="Cambria Math" panose="02040503050406030204" pitchFamily="18" charset="0"/>
+                                  </a:rPr>
+                                  <m:t>0</m:t>
+                                </m:r>
+                              </m:e>
+                              <m:e>
+                                <m:r>
+                                  <a:rPr lang="ru-RU" i="0">
+                                    <a:solidFill>
+                                      <a:schemeClr val="tx1"/>
+                                    </a:solidFill>
+                                    <a:latin typeface="Cambria Math" panose="02040503050406030204" pitchFamily="18" charset="0"/>
+                                  </a:rPr>
+                                  <m:t>0</m:t>
+                                </m:r>
+                              </m:e>
+                            </m:mr>
+                            <m:mr>
+                              <m:e>
+                                <m:r>
+                                  <a:rPr lang="ru-RU" i="0">
+                                    <a:solidFill>
+                                      <a:schemeClr val="tx1"/>
+                                    </a:solidFill>
+                                    <a:latin typeface="Cambria Math" panose="02040503050406030204" pitchFamily="18" charset="0"/>
+                                  </a:rPr>
+                                  <m:t>0</m:t>
+                                </m:r>
+                              </m:e>
+                              <m:e>
+                                <m:f>
+                                  <m:fPr>
+                                    <m:ctrlPr>
+                                      <a:rPr lang="ru-RU" i="1">
+                                        <a:solidFill>
+                                          <a:schemeClr val="tx1"/>
+                                        </a:solidFill>
+                                        <a:latin typeface="Cambria Math" panose="02040503050406030204" pitchFamily="18" charset="0"/>
+                                      </a:rPr>
+                                    </m:ctrlPr>
+                                  </m:fPr>
+                                  <m:num>
+                                    <m:r>
+                                      <a:rPr lang="ru-RU" i="0">
+                                        <a:solidFill>
+                                          <a:schemeClr val="tx1"/>
+                                        </a:solidFill>
+                                        <a:latin typeface="Cambria Math" panose="02040503050406030204" pitchFamily="18" charset="0"/>
+                                      </a:rPr>
+                                      <m:t>1</m:t>
+                                    </m:r>
+                                  </m:num>
+                                  <m:den>
+                                    <m:func>
+                                      <m:funcPr>
+                                        <m:ctrlPr>
+                                          <a:rPr lang="ru-RU" i="1">
+                                            <a:solidFill>
+                                              <a:schemeClr val="tx1"/>
+                                            </a:solidFill>
+                                            <a:latin typeface="Cambria Math" panose="02040503050406030204" pitchFamily="18" charset="0"/>
+                                          </a:rPr>
+                                        </m:ctrlPr>
+                                      </m:funcPr>
+                                      <m:fName>
+                                        <m:r>
+                                          <m:rPr>
+                                            <m:sty m:val="p"/>
+                                          </m:rPr>
+                                          <a:rPr lang="ru-RU" i="0">
+                                            <a:solidFill>
+                                              <a:schemeClr val="tx1"/>
+                                            </a:solidFill>
+                                            <a:latin typeface="Cambria Math" panose="02040503050406030204" pitchFamily="18" charset="0"/>
+                                          </a:rPr>
+                                          <m:t>tan</m:t>
+                                        </m:r>
+                                      </m:fName>
+                                      <m:e>
+                                        <m:d>
+                                          <m:dPr>
+                                            <m:ctrlPr>
+                                              <a:rPr lang="ru-RU" i="1">
+                                                <a:solidFill>
+                                                  <a:schemeClr val="tx1"/>
+                                                </a:solidFill>
+                                                <a:latin typeface="Cambria Math" panose="02040503050406030204" pitchFamily="18" charset="0"/>
+                                              </a:rPr>
+                                            </m:ctrlPr>
+                                          </m:dPr>
+                                          <m:e>
+                                            <m:r>
+                                              <a:rPr lang="ru-RU" i="0">
+                                                <a:solidFill>
+                                                  <a:schemeClr val="tx1"/>
+                                                </a:solidFill>
+                                                <a:latin typeface="Cambria Math" panose="02040503050406030204" pitchFamily="18" charset="0"/>
+                                              </a:rPr>
+                                              <m:t>0.5∗</m:t>
+                                            </m:r>
+                                            <m:r>
+                                              <a:rPr lang="ru-RU" i="1">
+                                                <a:solidFill>
+                                                  <a:schemeClr val="tx1"/>
+                                                </a:solidFill>
+                                                <a:latin typeface="Cambria Math" panose="02040503050406030204" pitchFamily="18" charset="0"/>
+                                              </a:rPr>
+                                              <m:t>𝑦</m:t>
+                                            </m:r>
+                                          </m:e>
+                                        </m:d>
+                                      </m:e>
+                                    </m:func>
+                                  </m:den>
+                                </m:f>
+                              </m:e>
+                              <m:e>
+                                <m:r>
+                                  <a:rPr lang="ru-RU" i="0">
+                                    <a:solidFill>
+                                      <a:schemeClr val="tx1"/>
+                                    </a:solidFill>
+                                    <a:latin typeface="Cambria Math" panose="02040503050406030204" pitchFamily="18" charset="0"/>
+                                  </a:rPr>
+                                  <m:t>0</m:t>
+                                </m:r>
+                              </m:e>
+                              <m:e>
+                                <m:r>
+                                  <a:rPr lang="ru-RU" i="0">
+                                    <a:solidFill>
+                                      <a:schemeClr val="tx1"/>
+                                    </a:solidFill>
+                                    <a:latin typeface="Cambria Math" panose="02040503050406030204" pitchFamily="18" charset="0"/>
+                                  </a:rPr>
+                                  <m:t>0</m:t>
+                                </m:r>
+                              </m:e>
+                            </m:mr>
+                            <m:mr>
+                              <m:e>
+                                <m:r>
+                                  <a:rPr lang="ru-RU" i="0">
+                                    <a:solidFill>
+                                      <a:schemeClr val="tx1"/>
+                                    </a:solidFill>
+                                    <a:latin typeface="Cambria Math" panose="02040503050406030204" pitchFamily="18" charset="0"/>
+                                  </a:rPr>
+                                  <m:t>0</m:t>
+                                </m:r>
+                              </m:e>
+                              <m:e>
+                                <m:r>
+                                  <a:rPr lang="ru-RU" i="0">
+                                    <a:solidFill>
+                                      <a:schemeClr val="tx1"/>
+                                    </a:solidFill>
+                                    <a:latin typeface="Cambria Math" panose="02040503050406030204" pitchFamily="18" charset="0"/>
+                                  </a:rPr>
+                                  <m:t>0</m:t>
+                                </m:r>
+                              </m:e>
+                              <m:e>
+                                <m:r>
+                                  <a:rPr lang="ru-RU" i="0">
+                                    <a:solidFill>
+                                      <a:schemeClr val="tx1"/>
+                                    </a:solidFill>
+                                    <a:latin typeface="Cambria Math" panose="02040503050406030204" pitchFamily="18" charset="0"/>
+                                  </a:rPr>
+                                  <m:t>−1</m:t>
+                                </m:r>
+                              </m:e>
+                              <m:e>
+                                <m:r>
+                                  <a:rPr lang="ru-RU" i="0">
+                                    <a:solidFill>
+                                      <a:schemeClr val="tx1"/>
+                                    </a:solidFill>
+                                    <a:latin typeface="Cambria Math" panose="02040503050406030204" pitchFamily="18" charset="0"/>
+                                  </a:rPr>
+                                  <m:t>−2</m:t>
+                                </m:r>
+                                <m:r>
+                                  <a:rPr lang="ru-RU" i="1">
+                                    <a:solidFill>
+                                      <a:schemeClr val="tx1"/>
+                                    </a:solidFill>
+                                    <a:latin typeface="Cambria Math" panose="02040503050406030204" pitchFamily="18" charset="0"/>
+                                  </a:rPr>
+                                  <m:t>𝑛</m:t>
+                                </m:r>
+                              </m:e>
+                            </m:mr>
+                            <m:mr>
+                              <m:e>
+                                <m:r>
+                                  <a:rPr lang="ru-RU" i="0">
+                                    <a:solidFill>
+                                      <a:schemeClr val="tx1"/>
+                                    </a:solidFill>
+                                    <a:latin typeface="Cambria Math" panose="02040503050406030204" pitchFamily="18" charset="0"/>
+                                  </a:rPr>
+                                  <m:t>0</m:t>
+                                </m:r>
+                              </m:e>
+                              <m:e>
+                                <m:r>
+                                  <a:rPr lang="ru-RU" i="0">
+                                    <a:solidFill>
+                                      <a:schemeClr val="tx1"/>
+                                    </a:solidFill>
+                                    <a:latin typeface="Cambria Math" panose="02040503050406030204" pitchFamily="18" charset="0"/>
+                                  </a:rPr>
+                                  <m:t>0</m:t>
+                                </m:r>
+                              </m:e>
+                              <m:e>
+                                <m:r>
+                                  <a:rPr lang="ru-RU" i="0">
+                                    <a:solidFill>
+                                      <a:schemeClr val="tx1"/>
+                                    </a:solidFill>
+                                    <a:latin typeface="Cambria Math" panose="02040503050406030204" pitchFamily="18" charset="0"/>
+                                  </a:rPr>
+                                  <m:t>−1</m:t>
+                                </m:r>
+                              </m:e>
+                              <m:e>
+                                <m:r>
+                                  <a:rPr lang="ru-RU" i="0">
+                                    <a:solidFill>
+                                      <a:schemeClr val="tx1"/>
+                                    </a:solidFill>
+                                    <a:latin typeface="Cambria Math" panose="02040503050406030204" pitchFamily="18" charset="0"/>
+                                  </a:rPr>
+                                  <m:t>0</m:t>
+                                </m:r>
+                              </m:e>
+                            </m:mr>
+                          </m:m>
+                        </m:e>
+                      </m:d>
+                    </m:oMath>
+                  </m:oMathPara>
+                </a14:m>
+                <a:endParaRPr lang="ru-RU" dirty="0">
+                  <a:solidFill>
+                    <a:schemeClr val="tx1"/>
+                  </a:solidFill>
+                </a:endParaRPr>
+              </a:p>
+            </p:txBody>
+          </p:sp>
+        </mc:Choice>
+        <mc:Fallback>
+          <p:sp>
+            <p:nvSpPr>
+              <p:cNvPr id="5" name="Прямоугольник 4"/>
+              <p:cNvSpPr>
+                <a:spLocks noRot="1" noChangeAspect="1" noMove="1" noResize="1" noEditPoints="1" noAdjustHandles="1" noChangeArrowheads="1" noChangeShapeType="1" noTextEdit="1"/>
+              </p:cNvSpPr>
+              <p:nvPr/>
+            </p:nvSpPr>
+            <p:spPr>
+              <a:xfrm>
+                <a:off x="762000" y="2705100"/>
+                <a:ext cx="4415631" cy="1660198"/>
+              </a:xfrm>
+              <a:prstGeom prst="rect">
+                <a:avLst/>
+              </a:prstGeom>
+              <a:blipFill>
+                <a:blip r:embed="rId3"/>
+                <a:stretch>
+                  <a:fillRect/>
+                </a:stretch>
+              </a:blipFill>
+            </p:spPr>
+            <p:txBody>
+              <a:bodyPr/>
+              <a:lstStyle/>
+              <a:p>
+                <a:r>
+                  <a:rPr lang="ru-RU">
+                    <a:noFill/>
+                  </a:rPr>
+                  <a:t> </a:t>
+                </a:r>
+              </a:p>
+            </p:txBody>
+          </p:sp>
+        </mc:Fallback>
+      </mc:AlternateContent>
+      <mc:AlternateContent xmlns:mc="http://schemas.openxmlformats.org/markup-compatibility/2006">
+        <mc:Choice xmlns:a14="http://schemas.microsoft.com/office/drawing/2010/main" Requires="a14">
+          <p:sp>
+            <p:nvSpPr>
+              <p:cNvPr id="6" name="Прямоугольник 5"/>
+              <p:cNvSpPr/>
+              <p:nvPr/>
+            </p:nvSpPr>
+            <p:spPr>
+              <a:xfrm>
+                <a:off x="5715000" y="464176"/>
+                <a:ext cx="2491131" cy="1891928"/>
+              </a:xfrm>
+              <a:prstGeom prst="rect">
+                <a:avLst/>
+              </a:prstGeom>
+            </p:spPr>
+            <p:txBody>
+              <a:bodyPr wrap="none">
+                <a:spAutoFit/>
+              </a:bodyPr>
+              <a:lstStyle/>
+              <a:p>
+                <a14:m>
+                  <m:oMathPara xmlns:m="http://schemas.openxmlformats.org/officeDocument/2006/math">
+                    <m:oMathParaPr>
+                      <m:jc m:val="centerGroup"/>
+                    </m:oMathParaPr>
+                    <m:oMath xmlns:m="http://schemas.openxmlformats.org/officeDocument/2006/math">
+                      <m:d>
+                        <m:dPr>
+                          <m:ctrlPr>
+                            <a:rPr lang="ru-RU" smtClean="0">
+                              <a:solidFill>
+                                <a:schemeClr val="tx1"/>
+                              </a:solidFill>
+                              <a:latin typeface="Cambria Math" panose="02040503050406030204" pitchFamily="18" charset="0"/>
+                            </a:rPr>
+                          </m:ctrlPr>
+                        </m:dPr>
+                        <m:e>
+                          <m:m>
+                            <m:mPr>
+                              <m:mcs>
+                                <m:mc>
+                                  <m:mcPr>
+                                    <m:count m:val="4"/>
+                                    <m:mcJc m:val="center"/>
+                                  </m:mcPr>
+                                </m:mc>
+                              </m:mcs>
+                              <m:ctrlPr>
+                                <a:rPr lang="ru-RU">
+                                  <a:solidFill>
+                                    <a:schemeClr val="tx1"/>
+                                  </a:solidFill>
+                                  <a:latin typeface="Cambria Math" panose="02040503050406030204" pitchFamily="18" charset="0"/>
+                                </a:rPr>
+                              </m:ctrlPr>
+                            </m:mPr>
+                            <m:mr>
+                              <m:e>
+                                <m:f>
+                                  <m:fPr>
+                                    <m:ctrlPr>
+                                      <a:rPr lang="ru-RU">
+                                        <a:solidFill>
+                                          <a:schemeClr val="tx1"/>
+                                        </a:solidFill>
+                                        <a:latin typeface="Cambria Math" panose="02040503050406030204" pitchFamily="18" charset="0"/>
+                                      </a:rPr>
+                                    </m:ctrlPr>
+                                  </m:fPr>
+                                  <m:num>
+                                    <m:r>
+                                      <a:rPr lang="ru-RU">
+                                        <a:solidFill>
+                                          <a:schemeClr val="tx1"/>
+                                        </a:solidFill>
+                                        <a:latin typeface="Cambria Math" panose="02040503050406030204" pitchFamily="18" charset="0"/>
+                                      </a:rPr>
+                                      <m:t>1</m:t>
+                                    </m:r>
+                                  </m:num>
+                                  <m:den>
+                                    <m:r>
+                                      <a:rPr lang="ru-RU" i="1">
+                                        <a:solidFill>
+                                          <a:schemeClr val="tx1"/>
+                                        </a:solidFill>
+                                        <a:latin typeface="Cambria Math" panose="02040503050406030204" pitchFamily="18" charset="0"/>
+                                      </a:rPr>
+                                      <m:t>𝑟</m:t>
+                                    </m:r>
+                                  </m:den>
+                                </m:f>
+                              </m:e>
+                              <m:e>
+                                <m:r>
+                                  <a:rPr lang="ru-RU" i="0">
+                                    <a:solidFill>
+                                      <a:schemeClr val="tx1"/>
+                                    </a:solidFill>
+                                    <a:latin typeface="Cambria Math" panose="02040503050406030204" pitchFamily="18" charset="0"/>
+                                  </a:rPr>
+                                  <m:t>0</m:t>
+                                </m:r>
+                              </m:e>
+                              <m:e>
+                                <m:r>
+                                  <a:rPr lang="ru-RU" i="0">
+                                    <a:solidFill>
+                                      <a:schemeClr val="tx1"/>
+                                    </a:solidFill>
+                                    <a:latin typeface="Cambria Math" panose="02040503050406030204" pitchFamily="18" charset="0"/>
+                                  </a:rPr>
+                                  <m:t>0</m:t>
+                                </m:r>
+                              </m:e>
+                              <m:e>
+                                <m:r>
+                                  <a:rPr lang="ru-RU" i="0">
+                                    <a:solidFill>
+                                      <a:schemeClr val="tx1"/>
+                                    </a:solidFill>
+                                    <a:latin typeface="Cambria Math" panose="02040503050406030204" pitchFamily="18" charset="0"/>
+                                  </a:rPr>
+                                  <m:t>0</m:t>
+                                </m:r>
+                              </m:e>
+                            </m:mr>
+                            <m:mr>
+                              <m:e>
+                                <m:r>
+                                  <a:rPr lang="ru-RU" i="0">
+                                    <a:solidFill>
+                                      <a:schemeClr val="tx1"/>
+                                    </a:solidFill>
+                                    <a:latin typeface="Cambria Math" panose="02040503050406030204" pitchFamily="18" charset="0"/>
+                                  </a:rPr>
+                                  <m:t>0</m:t>
+                                </m:r>
+                              </m:e>
+                              <m:e>
+                                <m:f>
+                                  <m:fPr>
+                                    <m:ctrlPr>
+                                      <a:rPr lang="ru-RU" i="1">
+                                        <a:solidFill>
+                                          <a:schemeClr val="tx1"/>
+                                        </a:solidFill>
+                                        <a:latin typeface="Cambria Math" panose="02040503050406030204" pitchFamily="18" charset="0"/>
+                                      </a:rPr>
+                                    </m:ctrlPr>
+                                  </m:fPr>
+                                  <m:num>
+                                    <m:r>
+                                      <a:rPr lang="ru-RU" i="0">
+                                        <a:solidFill>
+                                          <a:schemeClr val="tx1"/>
+                                        </a:solidFill>
+                                        <a:latin typeface="Cambria Math" panose="02040503050406030204" pitchFamily="18" charset="0"/>
+                                      </a:rPr>
+                                      <m:t>1</m:t>
+                                    </m:r>
+                                  </m:num>
+                                  <m:den>
+                                    <m:r>
+                                      <a:rPr lang="ru-RU" i="1">
+                                        <a:solidFill>
+                                          <a:schemeClr val="tx1"/>
+                                        </a:solidFill>
+                                        <a:latin typeface="Cambria Math" panose="02040503050406030204" pitchFamily="18" charset="0"/>
+                                      </a:rPr>
+                                      <m:t>𝑡</m:t>
+                                    </m:r>
+                                  </m:den>
+                                </m:f>
+                              </m:e>
+                              <m:e>
+                                <m:r>
+                                  <a:rPr lang="ru-RU" i="0">
+                                    <a:solidFill>
+                                      <a:schemeClr val="tx1"/>
+                                    </a:solidFill>
+                                    <a:latin typeface="Cambria Math" panose="02040503050406030204" pitchFamily="18" charset="0"/>
+                                  </a:rPr>
+                                  <m:t>0</m:t>
+                                </m:r>
+                              </m:e>
+                              <m:e>
+                                <m:r>
+                                  <a:rPr lang="ru-RU" i="0">
+                                    <a:solidFill>
+                                      <a:schemeClr val="tx1"/>
+                                    </a:solidFill>
+                                    <a:latin typeface="Cambria Math" panose="02040503050406030204" pitchFamily="18" charset="0"/>
+                                  </a:rPr>
+                                  <m:t>0</m:t>
+                                </m:r>
+                              </m:e>
+                            </m:mr>
+                            <m:mr>
+                              <m:e>
+                                <m:r>
+                                  <a:rPr lang="ru-RU" i="0">
+                                    <a:solidFill>
+                                      <a:schemeClr val="tx1"/>
+                                    </a:solidFill>
+                                    <a:latin typeface="Cambria Math" panose="02040503050406030204" pitchFamily="18" charset="0"/>
+                                  </a:rPr>
+                                  <m:t>0</m:t>
+                                </m:r>
+                              </m:e>
+                              <m:e>
+                                <m:r>
+                                  <a:rPr lang="ru-RU" i="0">
+                                    <a:solidFill>
+                                      <a:schemeClr val="tx1"/>
+                                    </a:solidFill>
+                                    <a:latin typeface="Cambria Math" panose="02040503050406030204" pitchFamily="18" charset="0"/>
+                                  </a:rPr>
+                                  <m:t>0</m:t>
+                                </m:r>
+                              </m:e>
+                              <m:e>
+                                <m:f>
+                                  <m:fPr>
+                                    <m:ctrlPr>
+                                      <a:rPr lang="ru-RU" i="1">
+                                        <a:solidFill>
+                                          <a:schemeClr val="tx1"/>
+                                        </a:solidFill>
+                                        <a:latin typeface="Cambria Math" panose="02040503050406030204" pitchFamily="18" charset="0"/>
+                                      </a:rPr>
+                                    </m:ctrlPr>
+                                  </m:fPr>
+                                  <m:num>
+                                    <m:r>
+                                      <a:rPr lang="ru-RU" i="0">
+                                        <a:solidFill>
+                                          <a:schemeClr val="tx1"/>
+                                        </a:solidFill>
+                                        <a:latin typeface="Cambria Math" panose="02040503050406030204" pitchFamily="18" charset="0"/>
+                                      </a:rPr>
+                                      <m:t>2</m:t>
+                                    </m:r>
+                                  </m:num>
+                                  <m:den>
+                                    <m:r>
+                                      <a:rPr lang="ru-RU" i="1">
+                                        <a:solidFill>
+                                          <a:schemeClr val="tx1"/>
+                                        </a:solidFill>
+                                        <a:latin typeface="Cambria Math" panose="02040503050406030204" pitchFamily="18" charset="0"/>
+                                      </a:rPr>
+                                      <m:t>𝑛</m:t>
+                                    </m:r>
+                                    <m:r>
+                                      <a:rPr lang="ru-RU" i="0">
+                                        <a:solidFill>
+                                          <a:schemeClr val="tx1"/>
+                                        </a:solidFill>
+                                        <a:latin typeface="Cambria Math" panose="02040503050406030204" pitchFamily="18" charset="0"/>
+                                      </a:rPr>
+                                      <m:t>−</m:t>
+                                    </m:r>
+                                    <m:r>
+                                      <a:rPr lang="ru-RU" i="1">
+                                        <a:solidFill>
+                                          <a:schemeClr val="tx1"/>
+                                        </a:solidFill>
+                                        <a:latin typeface="Cambria Math" panose="02040503050406030204" pitchFamily="18" charset="0"/>
+                                      </a:rPr>
+                                      <m:t>𝑓</m:t>
+                                    </m:r>
+                                  </m:den>
+                                </m:f>
+                              </m:e>
+                              <m:e>
+                                <m:f>
+                                  <m:fPr>
+                                    <m:ctrlPr>
+                                      <a:rPr lang="ru-RU" i="1">
+                                        <a:solidFill>
+                                          <a:schemeClr val="tx1"/>
+                                        </a:solidFill>
+                                        <a:latin typeface="Cambria Math" panose="02040503050406030204" pitchFamily="18" charset="0"/>
+                                      </a:rPr>
+                                    </m:ctrlPr>
+                                  </m:fPr>
+                                  <m:num>
+                                    <m:r>
+                                      <a:rPr lang="ru-RU" i="1">
+                                        <a:solidFill>
+                                          <a:schemeClr val="tx1"/>
+                                        </a:solidFill>
+                                        <a:latin typeface="Cambria Math" panose="02040503050406030204" pitchFamily="18" charset="0"/>
+                                      </a:rPr>
+                                      <m:t>𝑓</m:t>
+                                    </m:r>
+                                    <m:r>
+                                      <a:rPr lang="ru-RU" i="0">
+                                        <a:solidFill>
+                                          <a:schemeClr val="tx1"/>
+                                        </a:solidFill>
+                                        <a:latin typeface="Cambria Math" panose="02040503050406030204" pitchFamily="18" charset="0"/>
+                                      </a:rPr>
+                                      <m:t>+</m:t>
+                                    </m:r>
+                                    <m:r>
+                                      <a:rPr lang="ru-RU" i="1">
+                                        <a:solidFill>
+                                          <a:schemeClr val="tx1"/>
+                                        </a:solidFill>
+                                        <a:latin typeface="Cambria Math" panose="02040503050406030204" pitchFamily="18" charset="0"/>
+                                      </a:rPr>
+                                      <m:t>𝑛</m:t>
+                                    </m:r>
+                                  </m:num>
+                                  <m:den>
+                                    <m:r>
+                                      <a:rPr lang="ru-RU" i="1">
+                                        <a:solidFill>
+                                          <a:schemeClr val="tx1"/>
+                                        </a:solidFill>
+                                        <a:latin typeface="Cambria Math" panose="02040503050406030204" pitchFamily="18" charset="0"/>
+                                      </a:rPr>
+                                      <m:t>𝑛</m:t>
+                                    </m:r>
+                                    <m:r>
+                                      <a:rPr lang="ru-RU" i="0">
+                                        <a:solidFill>
+                                          <a:schemeClr val="tx1"/>
+                                        </a:solidFill>
+                                        <a:latin typeface="Cambria Math" panose="02040503050406030204" pitchFamily="18" charset="0"/>
+                                      </a:rPr>
+                                      <m:t>−</m:t>
+                                    </m:r>
+                                    <m:r>
+                                      <a:rPr lang="ru-RU" i="1">
+                                        <a:solidFill>
+                                          <a:schemeClr val="tx1"/>
+                                        </a:solidFill>
+                                        <a:latin typeface="Cambria Math" panose="02040503050406030204" pitchFamily="18" charset="0"/>
+                                      </a:rPr>
+                                      <m:t>𝑓</m:t>
+                                    </m:r>
+                                  </m:den>
+                                </m:f>
+                              </m:e>
+                            </m:mr>
+                            <m:mr>
+                              <m:e>
+                                <m:r>
+                                  <a:rPr lang="ru-RU" i="0">
+                                    <a:solidFill>
+                                      <a:schemeClr val="tx1"/>
+                                    </a:solidFill>
+                                    <a:latin typeface="Cambria Math" panose="02040503050406030204" pitchFamily="18" charset="0"/>
+                                  </a:rPr>
+                                  <m:t>0</m:t>
+                                </m:r>
+                              </m:e>
+                              <m:e>
+                                <m:r>
+                                  <a:rPr lang="ru-RU" i="0">
+                                    <a:solidFill>
+                                      <a:schemeClr val="tx1"/>
+                                    </a:solidFill>
+                                    <a:latin typeface="Cambria Math" panose="02040503050406030204" pitchFamily="18" charset="0"/>
+                                  </a:rPr>
+                                  <m:t>0</m:t>
+                                </m:r>
+                              </m:e>
+                              <m:e>
+                                <m:r>
+                                  <a:rPr lang="ru-RU" i="0">
+                                    <a:solidFill>
+                                      <a:schemeClr val="tx1"/>
+                                    </a:solidFill>
+                                    <a:latin typeface="Cambria Math" panose="02040503050406030204" pitchFamily="18" charset="0"/>
+                                  </a:rPr>
+                                  <m:t>0</m:t>
+                                </m:r>
+                              </m:e>
+                              <m:e>
+                                <m:r>
+                                  <a:rPr lang="ru-RU" i="0">
+                                    <a:solidFill>
+                                      <a:schemeClr val="tx1"/>
+                                    </a:solidFill>
+                                    <a:latin typeface="Cambria Math" panose="02040503050406030204" pitchFamily="18" charset="0"/>
+                                  </a:rPr>
+                                  <m:t>1</m:t>
+                                </m:r>
+                              </m:e>
+                            </m:mr>
+                          </m:m>
+                        </m:e>
+                      </m:d>
+                    </m:oMath>
+                  </m:oMathPara>
+                </a14:m>
+                <a:endParaRPr lang="ru-RU" dirty="0">
+                  <a:solidFill>
+                    <a:schemeClr val="tx1"/>
+                  </a:solidFill>
+                </a:endParaRPr>
+              </a:p>
+            </p:txBody>
+          </p:sp>
+        </mc:Choice>
+        <mc:Fallback>
+          <p:sp>
+            <p:nvSpPr>
+              <p:cNvPr id="6" name="Прямоугольник 5"/>
+              <p:cNvSpPr>
+                <a:spLocks noRot="1" noChangeAspect="1" noMove="1" noResize="1" noEditPoints="1" noAdjustHandles="1" noChangeArrowheads="1" noChangeShapeType="1" noTextEdit="1"/>
+              </p:cNvSpPr>
+              <p:nvPr/>
+            </p:nvSpPr>
+            <p:spPr>
+              <a:xfrm>
+                <a:off x="5715000" y="464176"/>
+                <a:ext cx="2491131" cy="1891928"/>
+              </a:xfrm>
+              <a:prstGeom prst="rect">
+                <a:avLst/>
+              </a:prstGeom>
+              <a:blipFill>
+                <a:blip r:embed="rId4"/>
+                <a:stretch>
+                  <a:fillRect/>
+                </a:stretch>
+              </a:blipFill>
+            </p:spPr>
+            <p:txBody>
+              <a:bodyPr/>
+              <a:lstStyle/>
+              <a:p>
+                <a:r>
+                  <a:rPr lang="ru-RU">
+                    <a:noFill/>
+                  </a:rPr>
+                  <a:t> </a:t>
+                </a:r>
+              </a:p>
+            </p:txBody>
+          </p:sp>
+        </mc:Fallback>
+      </mc:AlternateContent>
+    </p:spTree>
+    <p:extLst>
+      <p:ext uri="{BB962C8B-B14F-4D97-AF65-F5344CB8AC3E}">
+        <p14:creationId xmlns:p14="http://schemas.microsoft.com/office/powerpoint/2010/main" val="2400906542"/>
+      </p:ext>
+    </p:extLst>
+  </p:cSld>
+  <p:clrMapOvr>
+    <a:masterClrMapping/>
+  </p:clrMapOvr>
+  <p:transition>
+    <p:fade/>
+  </p:transition>
 </p:sld>
 </file>
 

</xml_diff>